<commit_message>
Wrote a bit on the pptx
</commit_message>
<xml_diff>
--- a/Realtime web applications.pptx
+++ b/Realtime web applications.pptx
@@ -111,6 +111,11 @@
       </a:defRPr>
     </a:lvl9pPr>
   </p:defaultTextStyle>
+  <p:extLst>
+    <p:ext uri="{EFAFB233-063F-42B5-8137-9DF3F51BA10A}">
+      <p15:sldGuideLst xmlns:p15="http://schemas.microsoft.com/office/powerpoint/2012/main"/>
+    </p:ext>
+  </p:extLst>
 </p:presentation>
 </file>
 
@@ -3899,7 +3904,106 @@
           <a:bodyPr/>
           <a:lstStyle/>
           <a:p>
-            <a:endParaRPr lang="en-US"/>
+            <a:pPr marL="514350" indent="-514350">
+              <a:buFont typeface="+mj-lt"/>
+              <a:buAutoNum type="arabicPeriod"/>
+            </a:pPr>
+            <a:r>
+              <a:rPr lang="en-US" dirty="0"/>
+              <a:t>To start the server, use "</a:t>
+            </a:r>
+            <a:r>
+              <a:rPr lang="en-US" dirty="0" err="1"/>
+              <a:t>npm</a:t>
+            </a:r>
+            <a:r>
+              <a:rPr lang="en-US" dirty="0"/>
+              <a:t> run </a:t>
+            </a:r>
+            <a:r>
+              <a:rPr lang="en-US" dirty="0" err="1"/>
+              <a:t>serverStart</a:t>
+            </a:r>
+            <a:r>
+              <a:rPr lang="en-US" dirty="0"/>
+              <a:t>" in the server folder (</a:t>
+            </a:r>
+            <a:r>
+              <a:rPr lang="en-US" dirty="0" err="1"/>
+              <a:t>cmd</a:t>
+            </a:r>
+            <a:r>
+              <a:rPr lang="en-US" dirty="0"/>
+              <a:t>, </a:t>
+            </a:r>
+            <a:r>
+              <a:rPr lang="en-US" dirty="0" err="1"/>
+              <a:t>VSCode</a:t>
+            </a:r>
+            <a:r>
+              <a:rPr lang="en-US" dirty="0"/>
+              <a:t> terminal or </a:t>
+            </a:r>
+            <a:r>
+              <a:rPr lang="en-US" dirty="0" err="1"/>
+              <a:t>powershell</a:t>
+            </a:r>
+            <a:r>
+              <a:rPr lang="en-US" dirty="0"/>
+              <a:t>)</a:t>
+            </a:r>
+          </a:p>
+          <a:p>
+            <a:pPr marL="514350" indent="-514350">
+              <a:buFont typeface="+mj-lt"/>
+              <a:buAutoNum type="arabicPeriod"/>
+            </a:pPr>
+            <a:r>
+              <a:rPr lang="en-US" dirty="0"/>
+              <a:t>To start client use "</a:t>
+            </a:r>
+            <a:r>
+              <a:rPr lang="en-US" dirty="0" err="1"/>
+              <a:t>npm</a:t>
+            </a:r>
+            <a:r>
+              <a:rPr lang="en-US" dirty="0"/>
+              <a:t> start" in client folder (</a:t>
+            </a:r>
+            <a:r>
+              <a:rPr lang="en-US" dirty="0" err="1"/>
+              <a:t>cmd</a:t>
+            </a:r>
+            <a:r>
+              <a:rPr lang="en-US" dirty="0"/>
+              <a:t>, </a:t>
+            </a:r>
+            <a:r>
+              <a:rPr lang="en-US" dirty="0" err="1"/>
+              <a:t>VSCode</a:t>
+            </a:r>
+            <a:r>
+              <a:rPr lang="en-US" dirty="0"/>
+              <a:t> terminal or </a:t>
+            </a:r>
+            <a:r>
+              <a:rPr lang="en-US" dirty="0" err="1"/>
+              <a:t>powershell</a:t>
+            </a:r>
+            <a:r>
+              <a:rPr lang="en-US" dirty="0"/>
+              <a:t>)</a:t>
+            </a:r>
+          </a:p>
+          <a:p>
+            <a:pPr marL="514350" indent="-514350">
+              <a:buFont typeface="+mj-lt"/>
+              <a:buAutoNum type="arabicPeriod"/>
+            </a:pPr>
+            <a:r>
+              <a:rPr lang="en-US" dirty="0"/>
+              <a:t>Open localhost:3000 in browser</a:t>
+            </a:r>
           </a:p>
         </p:txBody>
       </p:sp>
@@ -3982,7 +4086,35 @@
           <a:bodyPr/>
           <a:lstStyle/>
           <a:p>
-            <a:endParaRPr lang="en-US"/>
+            <a:r>
+              <a:rPr lang="en-US" dirty="0"/>
+              <a:t>Mongoose</a:t>
+            </a:r>
+          </a:p>
+          <a:p>
+            <a:r>
+              <a:rPr lang="en-US" dirty="0"/>
+              <a:t>Socket.io</a:t>
+            </a:r>
+          </a:p>
+          <a:p>
+            <a:pPr lvl="1"/>
+            <a:r>
+              <a:rPr lang="en-US" dirty="0"/>
+              <a:t>react-router-dom@5</a:t>
+            </a:r>
+          </a:p>
+          <a:p>
+            <a:pPr lvl="2"/>
+            <a:r>
+              <a:rPr lang="en-US" dirty="0"/>
+              <a:t>Still called switches and Redirect and it seemed to work better than never versions, as setting it up in the same way with the new names broke </a:t>
+            </a:r>
+            <a:r>
+              <a:rPr lang="en-US"/>
+              <a:t>the website</a:t>
+            </a:r>
+            <a:endParaRPr lang="en-US" dirty="0"/>
           </a:p>
         </p:txBody>
       </p:sp>
@@ -4065,7 +4197,34 @@
           <a:bodyPr/>
           <a:lstStyle/>
           <a:p>
-            <a:endParaRPr lang="en-US"/>
+            <a:r>
+              <a:rPr lang="en-US" dirty="0"/>
+              <a:t>Mainly used is</a:t>
+            </a:r>
+          </a:p>
+          <a:p>
+            <a:pPr lvl="1"/>
+            <a:r>
+              <a:rPr lang="en-US" dirty="0" err="1"/>
+              <a:t>useCallback</a:t>
+            </a:r>
+            <a:endParaRPr lang="en-US" dirty="0"/>
+          </a:p>
+          <a:p>
+            <a:pPr lvl="1"/>
+            <a:r>
+              <a:rPr lang="en-US" dirty="0" err="1"/>
+              <a:t>useEffeck</a:t>
+            </a:r>
+            <a:endParaRPr lang="en-US" dirty="0"/>
+          </a:p>
+          <a:p>
+            <a:pPr lvl="1"/>
+            <a:r>
+              <a:rPr lang="en-US" dirty="0" err="1"/>
+              <a:t>useState</a:t>
+            </a:r>
+            <a:endParaRPr lang="en-US" dirty="0"/>
           </a:p>
         </p:txBody>
       </p:sp>

</xml_diff>

<commit_message>
lidt mere lort på pptx
</commit_message>
<xml_diff>
--- a/Realtime web applications.pptx
+++ b/Realtime web applications.pptx
@@ -275,7 +275,7 @@
             <a:fld id="{11A6662E-FAF4-44BC-88B5-85A7CBFB6D30}" type="datetime1">
               <a:rPr lang="en-US" smtClean="0"/>
               <a:pPr/>
-              <a:t>11-May-23</a:t>
+              <a:t>12-May-23</a:t>
             </a:fld>
             <a:endParaRPr lang="en-US"/>
           </a:p>
@@ -486,7 +486,7 @@
           <a:p>
             <a:fld id="{4C559632-1575-4E14-B53B-3DC3D5ED3947}" type="datetime1">
               <a:rPr lang="en-US" smtClean="0"/>
-              <a:t>11-May-23</a:t>
+              <a:t>12-May-23</a:t>
             </a:fld>
             <a:endParaRPr lang="en-US"/>
           </a:p>
@@ -694,7 +694,7 @@
           <a:p>
             <a:fld id="{CC4A6868-2568-4CC9-B302-F37117B01A6E}" type="datetime1">
               <a:rPr lang="en-US" smtClean="0"/>
-              <a:t>11-May-23</a:t>
+              <a:t>12-May-23</a:t>
             </a:fld>
             <a:endParaRPr lang="en-US"/>
           </a:p>
@@ -897,7 +897,7 @@
           <a:p>
             <a:fld id="{0055F08A-1E71-4B2B-BB49-E743F2903911}" type="datetime1">
               <a:rPr lang="en-US" smtClean="0"/>
-              <a:t>11-May-23</a:t>
+              <a:t>12-May-23</a:t>
             </a:fld>
             <a:endParaRPr lang="en-US" dirty="0"/>
           </a:p>
@@ -1171,7 +1171,7 @@
           <a:p>
             <a:fld id="{15417D9E-721A-44BB-8863-9873FE64DA75}" type="datetime1">
               <a:rPr lang="en-US" smtClean="0"/>
-              <a:t>11-May-23</a:t>
+              <a:t>12-May-23</a:t>
             </a:fld>
             <a:endParaRPr lang="en-US"/>
           </a:p>
@@ -1441,7 +1441,7 @@
           <a:p>
             <a:fld id="{5F31DA2F-80B8-49CF-99FB-5ABCA53A607A}" type="datetime1">
               <a:rPr lang="en-US" smtClean="0"/>
-              <a:t>11-May-23</a:t>
+              <a:t>12-May-23</a:t>
             </a:fld>
             <a:endParaRPr lang="en-US"/>
           </a:p>
@@ -1854,7 +1854,7 @@
           <a:p>
             <a:fld id="{28852172-E6C9-4B6C-929A-A9DE3837BBF1}" type="datetime1">
               <a:rPr lang="en-US" smtClean="0"/>
-              <a:t>11-May-23</a:t>
+              <a:t>12-May-23</a:t>
             </a:fld>
             <a:endParaRPr lang="en-US"/>
           </a:p>
@@ -2000,7 +2000,7 @@
           <a:p>
             <a:fld id="{3AB41CFF-90C9-47B3-9DA1-F2BF8D839F7E}" type="datetime1">
               <a:rPr lang="en-US" smtClean="0"/>
-              <a:t>11-May-23</a:t>
+              <a:t>12-May-23</a:t>
             </a:fld>
             <a:endParaRPr lang="en-US"/>
           </a:p>
@@ -2113,7 +2113,7 @@
           <a:p>
             <a:fld id="{F06048FA-06AB-4884-A69B-986B96E68A24}" type="datetime1">
               <a:rPr lang="en-US" smtClean="0"/>
-              <a:t>11-May-23</a:t>
+              <a:t>12-May-23</a:t>
             </a:fld>
             <a:endParaRPr lang="en-US"/>
           </a:p>
@@ -2424,7 +2424,7 @@
           <a:p>
             <a:fld id="{50DB7ABA-0172-4F9C-889D-567164F66BCD}" type="datetime1">
               <a:rPr lang="en-US" smtClean="0"/>
-              <a:t>11-May-23</a:t>
+              <a:t>12-May-23</a:t>
             </a:fld>
             <a:endParaRPr lang="en-US"/>
           </a:p>
@@ -2715,7 +2715,7 @@
           <a:p>
             <a:fld id="{78AC6A5B-8AE7-4A41-B5A7-9ADC6686DC18}" type="datetime1">
               <a:rPr lang="en-US" smtClean="0"/>
-              <a:t>11-May-23</a:t>
+              <a:t>12-May-23</a:t>
             </a:fld>
             <a:endParaRPr lang="en-US"/>
           </a:p>
@@ -3061,7 +3061,7 @@
             <a:fld id="{57E0CF6C-748E-4B7A-BC8B-3011EF78ED13}" type="datetime1">
               <a:rPr lang="en-US" smtClean="0"/>
               <a:pPr/>
-              <a:t>11-May-23</a:t>
+              <a:t>12-May-23</a:t>
             </a:fld>
             <a:endParaRPr lang="en-US" dirty="0"/>
           </a:p>
@@ -4083,7 +4083,9 @@
         </p:nvSpPr>
         <p:spPr/>
         <p:txBody>
-          <a:bodyPr/>
+          <a:bodyPr>
+            <a:normAutofit lnSpcReduction="10000"/>
+          </a:bodyPr>
           <a:lstStyle/>
           <a:p>
             <a:r>
@@ -4092,6 +4094,13 @@
             </a:r>
           </a:p>
           <a:p>
+            <a:pPr lvl="1"/>
+            <a:r>
+              <a:rPr lang="en-US" dirty="0"/>
+              <a:t>Is the way we connected to the MongoDB, we could have installed a pure MongoDB module but have worked with mongoose before, and it still connects to a MongoDB</a:t>
+            </a:r>
+          </a:p>
+          <a:p>
             <a:r>
               <a:rPr lang="en-US" dirty="0"/>
               <a:t>Socket.io</a:t>
@@ -4104,7 +4113,6 @@
             </a:r>
           </a:p>
           <a:p>
-            <a:pPr lvl="1"/>
             <a:r>
               <a:rPr lang="en-US" dirty="0"/>
               <a:t>react-router-dom@5</a:t>
@@ -4114,7 +4122,7 @@
             <a:pPr lvl="2"/>
             <a:r>
               <a:rPr lang="en-US" dirty="0"/>
-              <a:t>Still called switches and Redirect and it seemed to work better than never versions, as setting it up in the same way with the new names broke the website</a:t>
+              <a:t>Version 5 seemed to work better with switches and redirections instead of routes and navigation in version 6 and above.</a:t>
             </a:r>
           </a:p>
         </p:txBody>

</xml_diff>